<commit_message>
changed http to sync-request
</commit_message>
<xml_diff>
--- a/ReadifyB2B-Alexa.pptx
+++ b/ReadifyB2B-Alexa.pptx
@@ -526,20 +526,20 @@
             <ac:spMk id="2" creationId="{1907AA3C-7716-480B-9E25-D29C1F4B8E16}"/>
           </ac:spMkLst>
         </pc:spChg>
+        <pc:spChg chg="add del mod">
+          <ac:chgData name="Giovani Decusati" userId="e9e75d80-f139-4999-95c2-47cf86368938" providerId="ADAL" clId="{19609E3A-3601-4F6A-92C7-BD754E1465E7}" dt="2018-07-30T04:03:14.897" v="1351"/>
+          <ac:spMkLst>
+            <pc:docMk/>
+            <pc:sldMk cId="1313323197" sldId="260"/>
+            <ac:spMk id="3" creationId="{E21AE1C7-1455-4570-AE5B-D3F250E798F0}"/>
+          </ac:spMkLst>
+        </pc:spChg>
         <pc:spChg chg="del">
           <ac:chgData name="Giovani Decusati" userId="e9e75d80-f139-4999-95c2-47cf86368938" providerId="ADAL" clId="{19609E3A-3601-4F6A-92C7-BD754E1465E7}" dt="2018-07-27T00:50:34.367" v="238" actId="478"/>
           <ac:spMkLst>
             <pc:docMk/>
             <pc:sldMk cId="1313323197" sldId="260"/>
             <ac:spMk id="3" creationId="{A90FF9C7-89AB-481B-AF9A-30D9EE57790D}"/>
-          </ac:spMkLst>
-        </pc:spChg>
-        <pc:spChg chg="add del mod">
-          <ac:chgData name="Giovani Decusati" userId="e9e75d80-f139-4999-95c2-47cf86368938" providerId="ADAL" clId="{19609E3A-3601-4F6A-92C7-BD754E1465E7}" dt="2018-07-30T04:03:14.897" v="1351"/>
-          <ac:spMkLst>
-            <pc:docMk/>
-            <pc:sldMk cId="1313323197" sldId="260"/>
-            <ac:spMk id="3" creationId="{E21AE1C7-1455-4570-AE5B-D3F250E798F0}"/>
           </ac:spMkLst>
         </pc:spChg>
         <pc:spChg chg="add del">
@@ -1063,7 +1063,7 @@
           <a:p>
             <a:fld id="{1862C150-BE26-4D5C-9E6B-94B0DAE4EA08}" type="datetimeFigureOut">
               <a:rPr lang="en-AU" smtClean="0"/>
-              <a:t>30/07/2018</a:t>
+              <a:t>31/07/2018</a:t>
             </a:fld>
             <a:endParaRPr lang="en-AU"/>
           </a:p>
@@ -2461,12 +2461,226 @@
               <a:buChar char="-"/>
             </a:pPr>
             <a:r>
-              <a:rPr lang="en-AU"/>
+              <a:rPr lang="en-AU" dirty="0"/>
               <a:t>https://github.com/alexa/skill-sample-nodejs-hell</a:t>
             </a:r>
           </a:p>
           <a:p>
+            <a:pPr marL="171450" indent="-171450">
+              <a:buFontTx/>
+              <a:buChar char="-"/>
+            </a:pPr>
+            <a:endParaRPr lang="en-AU" dirty="0"/>
+          </a:p>
+          <a:p>
+            <a:pPr marL="171450" indent="-171450">
+              <a:buFontTx/>
+              <a:buChar char="-"/>
+            </a:pPr>
+            <a:r>
+              <a:rPr lang="en-AU" dirty="0"/>
+              <a:t>Testing</a:t>
+            </a:r>
+          </a:p>
+          <a:p>
+            <a:pPr marL="628650" marR="0" lvl="1" indent="-171450" algn="l" defTabSz="914400" rtl="0" eaLnBrk="1" fontAlgn="auto" latinLnBrk="0" hangingPunct="1">
+              <a:lnSpc>
+                <a:spcPct val="100000"/>
+              </a:lnSpc>
+              <a:spcBef>
+                <a:spcPts val="0"/>
+              </a:spcBef>
+              <a:spcAft>
+                <a:spcPts val="0"/>
+              </a:spcAft>
+              <a:buClrTx/>
+              <a:buSzTx/>
+              <a:buFontTx/>
+              <a:buChar char="-"/>
+              <a:tabLst/>
+              <a:defRPr/>
+            </a:pPr>
+            <a:r>
+              <a:rPr lang="en-AU" dirty="0"/>
+              <a:t>https://developer.amazon.com/alexa/console/</a:t>
+            </a:r>
+          </a:p>
+          <a:p>
+            <a:pPr marL="171450" indent="-171450">
+              <a:buFontTx/>
+              <a:buChar char="-"/>
+            </a:pPr>
+            <a:r>
+              <a:rPr lang="en-AU" dirty="0"/>
+              <a:t>Debugging</a:t>
+            </a:r>
+          </a:p>
+          <a:p>
             <a:pPr marL="628650" lvl="1" indent="-171450">
+              <a:buFontTx/>
+              <a:buChar char="-"/>
+            </a:pPr>
+            <a:r>
+              <a:rPr lang="en-AU" dirty="0"/>
+              <a:t>https://developer.amazon.com/blogs/post/tx24z2qzp5rrtg1/new-alexa-technical-tutorial-debugging-aws-lambda-code-locally</a:t>
+            </a:r>
+          </a:p>
+          <a:p>
+            <a:pPr marL="171450" indent="-171450">
+              <a:buFontTx/>
+              <a:buChar char="-"/>
+            </a:pPr>
+            <a:r>
+              <a:rPr lang="en-AU" dirty="0"/>
+              <a:t>Monitoring</a:t>
+            </a:r>
+          </a:p>
+          <a:p>
+            <a:pPr marL="628650" lvl="1" indent="-171450">
+              <a:buFontTx/>
+              <a:buChar char="-"/>
+            </a:pPr>
+            <a:r>
+              <a:rPr lang="en-AU" dirty="0"/>
+              <a:t>https://console.aws.amazon.com/lambda/ </a:t>
+            </a:r>
+          </a:p>
+          <a:p>
+            <a:pPr marL="171450" lvl="0" indent="-171450">
+              <a:buFontTx/>
+              <a:buChar char="-"/>
+            </a:pPr>
+            <a:r>
+              <a:rPr lang="en-AU" dirty="0"/>
+              <a:t>Logging </a:t>
+            </a:r>
+          </a:p>
+          <a:p>
+            <a:pPr marL="628650" lvl="1" indent="-171450">
+              <a:buFontTx/>
+              <a:buChar char="-"/>
+            </a:pPr>
+            <a:r>
+              <a:rPr lang="en-AU" dirty="0"/>
+              <a:t>CloudWatch</a:t>
+            </a:r>
+          </a:p>
+          <a:p>
+            <a:pPr marL="171450" marR="0" lvl="0" indent="-171450" algn="l" defTabSz="914400" rtl="0" eaLnBrk="1" fontAlgn="auto" latinLnBrk="0" hangingPunct="1">
+              <a:lnSpc>
+                <a:spcPct val="100000"/>
+              </a:lnSpc>
+              <a:spcBef>
+                <a:spcPts val="0"/>
+              </a:spcBef>
+              <a:spcAft>
+                <a:spcPts val="0"/>
+              </a:spcAft>
+              <a:buClrTx/>
+              <a:buSzTx/>
+              <a:buFontTx/>
+              <a:buChar char="-"/>
+              <a:tabLst/>
+              <a:defRPr/>
+            </a:pPr>
+            <a:r>
+              <a:rPr lang="en-AU" sz="1200" b="0" kern="1200" dirty="0">
+                <a:solidFill>
+                  <a:schemeClr val="tx1"/>
+                </a:solidFill>
+                <a:effectLst/>
+                <a:latin typeface="+mn-lt"/>
+                <a:ea typeface="+mn-ea"/>
+                <a:cs typeface="+mn-cs"/>
+              </a:rPr>
+              <a:t>Difficulties:</a:t>
+            </a:r>
+          </a:p>
+          <a:p>
+            <a:pPr marL="628650" marR="0" lvl="1" indent="-171450" algn="l" defTabSz="914400" rtl="0" eaLnBrk="1" fontAlgn="auto" latinLnBrk="0" hangingPunct="1">
+              <a:lnSpc>
+                <a:spcPct val="100000"/>
+              </a:lnSpc>
+              <a:spcBef>
+                <a:spcPts val="0"/>
+              </a:spcBef>
+              <a:spcAft>
+                <a:spcPts val="0"/>
+              </a:spcAft>
+              <a:buClrTx/>
+              <a:buSzTx/>
+              <a:buFontTx/>
+              <a:buChar char="-"/>
+              <a:tabLst/>
+              <a:defRPr/>
+            </a:pPr>
+            <a:r>
+              <a:rPr lang="en-AU" sz="1200" b="0" kern="1200" dirty="0">
+                <a:solidFill>
+                  <a:schemeClr val="tx1"/>
+                </a:solidFill>
+                <a:effectLst/>
+                <a:latin typeface="+mn-lt"/>
+                <a:ea typeface="+mn-ea"/>
+                <a:cs typeface="+mn-cs"/>
+              </a:rPr>
+              <a:t>Changed require('https’) to sync-request</a:t>
+            </a:r>
+          </a:p>
+          <a:p>
+            <a:pPr marL="628650" marR="0" lvl="1" indent="-171450" algn="l" defTabSz="914400" rtl="0" eaLnBrk="1" fontAlgn="auto" latinLnBrk="0" hangingPunct="1">
+              <a:lnSpc>
+                <a:spcPct val="100000"/>
+              </a:lnSpc>
+              <a:spcBef>
+                <a:spcPts val="0"/>
+              </a:spcBef>
+              <a:spcAft>
+                <a:spcPts val="0"/>
+              </a:spcAft>
+              <a:buClrTx/>
+              <a:buSzTx/>
+              <a:buFontTx/>
+              <a:buChar char="-"/>
+              <a:tabLst/>
+              <a:defRPr/>
+            </a:pPr>
+            <a:r>
+              <a:rPr lang="en-AU" sz="1200" b="0" kern="1200" dirty="0">
+                <a:solidFill>
+                  <a:schemeClr val="tx1"/>
+                </a:solidFill>
+                <a:effectLst/>
+                <a:latin typeface="+mn-lt"/>
+                <a:ea typeface="+mn-ea"/>
+                <a:cs typeface="+mn-cs"/>
+              </a:rPr>
+              <a:t>Debugging, monitor </a:t>
+            </a:r>
+            <a:r>
+              <a:rPr lang="en-AU" sz="1200" b="0" kern="1200">
+                <a:solidFill>
+                  <a:schemeClr val="tx1"/>
+                </a:solidFill>
+                <a:effectLst/>
+                <a:latin typeface="+mn-lt"/>
+                <a:ea typeface="+mn-ea"/>
+                <a:cs typeface="+mn-cs"/>
+              </a:rPr>
+              <a:t>and login</a:t>
+            </a:r>
+            <a:endParaRPr lang="en-AU" sz="1200" b="0" kern="1200" dirty="0">
+              <a:solidFill>
+                <a:schemeClr val="tx1"/>
+              </a:solidFill>
+              <a:effectLst/>
+              <a:latin typeface="+mn-lt"/>
+              <a:ea typeface="+mn-ea"/>
+              <a:cs typeface="+mn-cs"/>
+            </a:endParaRPr>
+          </a:p>
+          <a:p>
+            <a:pPr marL="171450" lvl="0" indent="-171450">
               <a:buFontTx/>
               <a:buChar char="-"/>
             </a:pPr>
@@ -2747,7 +2961,7 @@
           <a:p>
             <a:fld id="{A1C9F8B6-CAD5-493B-A17F-C35F3667CF5A}" type="datetimeFigureOut">
               <a:rPr lang="en-AU" smtClean="0"/>
-              <a:t>30/07/2018</a:t>
+              <a:t>31/07/2018</a:t>
             </a:fld>
             <a:endParaRPr lang="en-AU"/>
           </a:p>
@@ -2947,7 +3161,7 @@
           <a:p>
             <a:fld id="{A1C9F8B6-CAD5-493B-A17F-C35F3667CF5A}" type="datetimeFigureOut">
               <a:rPr lang="en-AU" smtClean="0"/>
-              <a:t>30/07/2018</a:t>
+              <a:t>31/07/2018</a:t>
             </a:fld>
             <a:endParaRPr lang="en-AU"/>
           </a:p>
@@ -3157,7 +3371,7 @@
           <a:p>
             <a:fld id="{A1C9F8B6-CAD5-493B-A17F-C35F3667CF5A}" type="datetimeFigureOut">
               <a:rPr lang="en-AU" smtClean="0"/>
-              <a:t>30/07/2018</a:t>
+              <a:t>31/07/2018</a:t>
             </a:fld>
             <a:endParaRPr lang="en-AU"/>
           </a:p>
@@ -3357,7 +3571,7 @@
           <a:p>
             <a:fld id="{A1C9F8B6-CAD5-493B-A17F-C35F3667CF5A}" type="datetimeFigureOut">
               <a:rPr lang="en-AU" smtClean="0"/>
-              <a:t>30/07/2018</a:t>
+              <a:t>31/07/2018</a:t>
             </a:fld>
             <a:endParaRPr lang="en-AU"/>
           </a:p>
@@ -3633,7 +3847,7 @@
           <a:p>
             <a:fld id="{A1C9F8B6-CAD5-493B-A17F-C35F3667CF5A}" type="datetimeFigureOut">
               <a:rPr lang="en-AU" smtClean="0"/>
-              <a:t>30/07/2018</a:t>
+              <a:t>31/07/2018</a:t>
             </a:fld>
             <a:endParaRPr lang="en-AU"/>
           </a:p>
@@ -3901,7 +4115,7 @@
           <a:p>
             <a:fld id="{A1C9F8B6-CAD5-493B-A17F-C35F3667CF5A}" type="datetimeFigureOut">
               <a:rPr lang="en-AU" smtClean="0"/>
-              <a:t>30/07/2018</a:t>
+              <a:t>31/07/2018</a:t>
             </a:fld>
             <a:endParaRPr lang="en-AU"/>
           </a:p>
@@ -4316,7 +4530,7 @@
           <a:p>
             <a:fld id="{A1C9F8B6-CAD5-493B-A17F-C35F3667CF5A}" type="datetimeFigureOut">
               <a:rPr lang="en-AU" smtClean="0"/>
-              <a:t>30/07/2018</a:t>
+              <a:t>31/07/2018</a:t>
             </a:fld>
             <a:endParaRPr lang="en-AU"/>
           </a:p>
@@ -4458,7 +4672,7 @@
           <a:p>
             <a:fld id="{A1C9F8B6-CAD5-493B-A17F-C35F3667CF5A}" type="datetimeFigureOut">
               <a:rPr lang="en-AU" smtClean="0"/>
-              <a:t>30/07/2018</a:t>
+              <a:t>31/07/2018</a:t>
             </a:fld>
             <a:endParaRPr lang="en-AU"/>
           </a:p>
@@ -4571,7 +4785,7 @@
           <a:p>
             <a:fld id="{A1C9F8B6-CAD5-493B-A17F-C35F3667CF5A}" type="datetimeFigureOut">
               <a:rPr lang="en-AU" smtClean="0"/>
-              <a:t>30/07/2018</a:t>
+              <a:t>31/07/2018</a:t>
             </a:fld>
             <a:endParaRPr lang="en-AU"/>
           </a:p>
@@ -4884,7 +5098,7 @@
           <a:p>
             <a:fld id="{A1C9F8B6-CAD5-493B-A17F-C35F3667CF5A}" type="datetimeFigureOut">
               <a:rPr lang="en-AU" smtClean="0"/>
-              <a:t>30/07/2018</a:t>
+              <a:t>31/07/2018</a:t>
             </a:fld>
             <a:endParaRPr lang="en-AU"/>
           </a:p>
@@ -5173,7 +5387,7 @@
           <a:p>
             <a:fld id="{A1C9F8B6-CAD5-493B-A17F-C35F3667CF5A}" type="datetimeFigureOut">
               <a:rPr lang="en-AU" smtClean="0"/>
-              <a:t>30/07/2018</a:t>
+              <a:t>31/07/2018</a:t>
             </a:fld>
             <a:endParaRPr lang="en-AU"/>
           </a:p>
@@ -5416,7 +5630,7 @@
           <a:p>
             <a:fld id="{A1C9F8B6-CAD5-493B-A17F-C35F3667CF5A}" type="datetimeFigureOut">
               <a:rPr lang="en-AU" smtClean="0"/>
-              <a:t>30/07/2018</a:t>
+              <a:t>31/07/2018</a:t>
             </a:fld>
             <a:endParaRPr lang="en-AU"/>
           </a:p>

</xml_diff>